<commit_message>
added Power BI SuperStore project
</commit_message>
<xml_diff>
--- a/DataAnalysis_Visualization_PowerBI_GlobalStore/GlobalStore_SalesAnalysis_PowerBI.pptx
+++ b/DataAnalysis_Visualization_PowerBI_GlobalStore/GlobalStore_SalesAnalysis_PowerBI.pptx
@@ -196,7 +196,7 @@
             </a:lvl1pPr>
           </a:lstStyle>
           <a:p>
-            <a:fld id="{FC8C6A33-35BF-A44F-8C2E-8BEA482FFD42}" type="datetimeFigureOut">
+            <a:fld id="{67DC6E74-09FA-2140-9903-C601F78C0D20}" type="datetimeFigureOut">
               <a:rPr lang="en-US" smtClean="0"/>
               <a:t>6/18/23</a:t>
             </a:fld>
@@ -354,7 +354,7 @@
             </a:lvl1pPr>
           </a:lstStyle>
           <a:p>
-            <a:fld id="{1DA61EB4-7C05-2741-ACC3-B80F90B900C7}" type="slidenum">
+            <a:fld id="{491F88DA-7B63-C94F-98CF-E1BFA610A131}" type="slidenum">
               <a:rPr lang="en-US" smtClean="0"/>
               <a:t>‹#›</a:t>
             </a:fld>
@@ -365,7 +365,7 @@
     </p:spTree>
     <p:extLst>
       <p:ext uri="{BB962C8B-B14F-4D97-AF65-F5344CB8AC3E}">
-        <p14:creationId xmlns:p14="http://schemas.microsoft.com/office/powerpoint/2010/main" val="3640270807"/>
+        <p14:creationId xmlns:p14="http://schemas.microsoft.com/office/powerpoint/2010/main" val="1029381881"/>
       </p:ext>
     </p:extLst>
   </p:cSld>
@@ -703,7 +703,7 @@
           <a:p>
             <a:r>
               <a:rPr b="1" dirty="0"/>
-              <a:t>Global Store Sales Analysis</a:t>
+              <a:t>Global SuperStore Sales Analysis</a:t>
             </a:r>
             <a:endParaRPr dirty="0"/>
           </a:p>
@@ -3599,7 +3599,7 @@
         </p:blipFill>
         <p:spPr>
           <a:xfrm>
-            <a:off x="0" y="265176"/>
+            <a:off x="0" y="0"/>
             <a:ext cx="12192000" cy="6858000"/>
           </a:xfrm>
           <a:prstGeom prst="rect">
@@ -3620,7 +3620,7 @@
         <p:spPr>
           <a:xfrm>
             <a:off x="810584" y="2982149"/>
-            <a:ext cx="9013354" cy="600075"/>
+            <a:ext cx="9810524" cy="600075"/>
           </a:xfrm>
           <a:prstGeom prst="rect">
             <a:avLst/>
@@ -3694,7 +3694,7 @@
                 <a:ea typeface="Segoe UI Light" charset="0"/>
                 <a:cs typeface="Segoe UI Light" charset="0"/>
               </a:rPr>
-              <a:t>Global Store Sales Analysis (Power BI)</a:t>
+              <a:t>Global Super Store Sales Analysis (Power BI)</a:t>
             </a:r>
             <a:br>
               <a:rPr kumimoji="0" lang="en-US" sz="4400" b="0" i="0" u="none" strike="noStrike" kern="1200" cap="none" spc="0" normalizeH="0" baseline="0" noProof="0" dirty="0">
@@ -3746,6 +3746,20 @@
               </a:rPr>
               <a:t> Dey</a:t>
             </a:r>
+            <a:endParaRPr kumimoji="0" lang="en-US" sz="4400" b="0" i="0" u="none" strike="noStrike" kern="1200" cap="none" spc="0" normalizeH="0" baseline="0" noProof="0" dirty="0">
+              <a:ln>
+                <a:noFill/>
+              </a:ln>
+              <a:solidFill>
+                <a:srgbClr val="F3C910"/>
+              </a:solidFill>
+              <a:effectLst/>
+              <a:uLnTx/>
+              <a:uFillTx/>
+              <a:latin typeface="Segoe UI Light" charset="0"/>
+              <a:ea typeface="Segoe UI Light" charset="0"/>
+              <a:cs typeface="Segoe UI Light" charset="0"/>
+            </a:endParaRPr>
           </a:p>
         </p:txBody>
       </p:sp>
@@ -4013,7 +4027,7 @@
                 <a:ea typeface="Segoe UI" charset="0"/>
                 <a:cs typeface="Segoe UI" charset="0"/>
               </a:rPr>
-              <a:t>6/18/2023 9:48:27 PM UTC</a:t>
+              <a:t>6/18/2023 10:36:09 PM UTC</a:t>
             </a:r>
           </a:p>
         </p:txBody>
@@ -4181,7 +4195,7 @@
       </p:grpSpPr>
       <p:pic>
         <p:nvPicPr>
-          <p:cNvPr id="3" name="Picture" title="This slide contains the following visuals: Total Sales ,Total Quantity ,Year ,Sales by Region ,Total Orders ,Most Profitable Products ,Total Profit ,Sales by Category ,Sales by Market (Continent) ,Least Profitable Products ,Sales and Profit by Month ,Data source: https://powerbidocs.com/wp-content/uploads/2021/01/global_superstore_2016.xlsx ,Global Store Sales Analysis. Please refer to the notes on this slide for details">
+          <p:cNvPr id="3" name="Picture" title="This slide contains the following visuals: Total Sales ,Total Quantity ,Year ,Sales by Region ,Total Orders ,Most Profitable Products ,Total Profit ,Sales by Category ,Sales by Market (Continent) ,Least Profitable Products ,Sales and Profit by Month ,Data source: https://powerbidocs.com/wp-content/uploads/2021/01/global_superstore_2016.xlsx ,Global SuperStore Sales Analysis. Please refer to the notes on this slide for details">
             <a:hlinkClick r:id="rId3"/>
           </p:cNvPr>
           <p:cNvPicPr>

</xml_diff>